<commit_message>
Finalized presentation for NYU DH Showcase 2021
</commit_message>
<xml_diff>
--- a/nyudh_summerfellowship_jonathan_armoza.pptx
+++ b/nyudh_summerfellowship_jonathan_armoza.pptx
@@ -11,8 +11,9 @@
     <p:sldId id="264" r:id="rId5"/>
     <p:sldId id="258" r:id="rId6"/>
     <p:sldId id="261" r:id="rId7"/>
-    <p:sldId id="262" r:id="rId8"/>
-    <p:sldId id="265" r:id="rId9"/>
+    <p:sldId id="267" r:id="rId8"/>
+    <p:sldId id="268" r:id="rId9"/>
+    <p:sldId id="265" r:id="rId10"/>
   </p:sldIdLst>
   <p:sldSz cx="12192000" cy="6858000"/>
   <p:notesSz cx="6858000" cy="9144000"/>
@@ -3544,8 +3545,8 @@
         </p:nvSpPr>
         <p:spPr>
           <a:xfrm>
-            <a:off x="524165" y="5827970"/>
-            <a:ext cx="3290003" cy="369332"/>
+            <a:off x="524165" y="5735637"/>
+            <a:ext cx="4315540" cy="461665"/>
           </a:xfrm>
           <a:prstGeom prst="rect">
             <a:avLst/>
@@ -3559,7 +3560,7 @@
           <a:lstStyle/>
           <a:p>
             <a:r>
-              <a:rPr lang="en-US" dirty="0">
+              <a:rPr lang="en-US" sz="2400" dirty="0">
                 <a:solidFill>
                   <a:schemeClr val="bg1"/>
                 </a:solidFill>
@@ -3918,22 +3919,30 @@
         <p:spPr>
           <a:xfrm>
             <a:off x="838200" y="1825625"/>
-            <a:ext cx="5858164" cy="4351338"/>
+            <a:ext cx="5858164" cy="4449340"/>
           </a:xfrm>
         </p:spPr>
         <p:txBody>
           <a:bodyPr>
-            <a:normAutofit lnSpcReduction="10000"/>
+            <a:normAutofit fontScale="92500" lnSpcReduction="20000"/>
           </a:bodyPr>
           <a:lstStyle/>
           <a:p>
             <a:r>
               <a:rPr lang="en-US" dirty="0">
                 <a:solidFill>
+                  <a:srgbClr val="00B050"/>
+                </a:solidFill>
+              </a:rPr>
+              <a:t>Akaike Information Criteria</a:t>
+            </a:r>
+            <a:r>
+              <a:rPr lang="en-US" dirty="0">
+                <a:solidFill>
                   <a:schemeClr val="bg1"/>
                 </a:solidFill>
               </a:rPr>
-              <a:t>Akaike Information Criteria (AIC)</a:t>
+              <a:t> (AIC)</a:t>
             </a:r>
           </a:p>
           <a:p>
@@ -3964,7 +3973,7 @@
                   <a:schemeClr val="bg1"/>
                 </a:solidFill>
               </a:rPr>
-              <a:t>Estimator of prediction error – e.g. </a:t>
+              <a:t>Estimator of prediction error – i.e. </a:t>
             </a:r>
             <a:r>
               <a:rPr lang="en-US" dirty="0">
@@ -3982,21 +3991,18 @@
                   <a:schemeClr val="bg1"/>
                 </a:solidFill>
               </a:rPr>
-              <a:t>Used when no out of sample data is available or small </a:t>
-            </a:r>
-            <a:r>
-              <a:rPr lang="en-US">
+              <a:t>Used when no out of sample data is available or small data size</a:t>
+            </a:r>
+          </a:p>
+          <a:p>
+            <a:r>
+              <a:rPr lang="en-US" dirty="0">
                 <a:solidFill>
                   <a:schemeClr val="bg1"/>
                 </a:solidFill>
               </a:rPr>
-              <a:t>data size</a:t>
-            </a:r>
-            <a:endParaRPr lang="en-US" dirty="0">
-              <a:solidFill>
-                <a:schemeClr val="bg1"/>
-              </a:solidFill>
-            </a:endParaRPr>
+              <a:t>An alternative to traditional hypothesis testing</a:t>
+            </a:r>
           </a:p>
           <a:p>
             <a:r>
@@ -4005,7 +4011,15 @@
                   <a:schemeClr val="bg1"/>
                 </a:solidFill>
               </a:rPr>
-              <a:t>An alternative to traditional hypothesis testing</a:t>
+              <a:t>Among several kinds of </a:t>
+            </a:r>
+            <a:r>
+              <a:rPr lang="en-US" dirty="0">
+                <a:solidFill>
+                  <a:srgbClr val="FFFF00"/>
+                </a:solidFill>
+              </a:rPr>
+              <a:t>evidentiary bases for literary models.</a:t>
             </a:r>
           </a:p>
           <a:p>
@@ -4256,6 +4270,57 @@
       </p:grpSpPr>
       <p:sp>
         <p:nvSpPr>
+          <p:cNvPr id="9" name="Rounded Rectangular Callout 8">
+            <a:extLst>
+              <a:ext uri="{FF2B5EF4-FFF2-40B4-BE49-F238E27FC236}">
+                <a16:creationId xmlns:a16="http://schemas.microsoft.com/office/drawing/2014/main" id="{20C1E830-FE3A-734F-9736-414472B99412}"/>
+              </a:ext>
+            </a:extLst>
+          </p:cNvPr>
+          <p:cNvSpPr/>
+          <p:nvPr/>
+        </p:nvSpPr>
+        <p:spPr>
+          <a:xfrm>
+            <a:off x="2416854" y="243568"/>
+            <a:ext cx="7641542" cy="1294201"/>
+          </a:xfrm>
+          <a:prstGeom prst="wedgeRoundRectCallout">
+            <a:avLst>
+              <a:gd name="adj1" fmla="val 34899"/>
+              <a:gd name="adj2" fmla="val 85728"/>
+              <a:gd name="adj3" fmla="val 16667"/>
+            </a:avLst>
+          </a:prstGeom>
+          <a:ln>
+            <a:noFill/>
+          </a:ln>
+        </p:spPr>
+        <p:style>
+          <a:lnRef idx="2">
+            <a:schemeClr val="accent6"/>
+          </a:lnRef>
+          <a:fillRef idx="1">
+            <a:schemeClr val="lt1"/>
+          </a:fillRef>
+          <a:effectRef idx="0">
+            <a:schemeClr val="accent6"/>
+          </a:effectRef>
+          <a:fontRef idx="minor">
+            <a:schemeClr val="dk1"/>
+          </a:fontRef>
+        </p:style>
+        <p:txBody>
+          <a:bodyPr rtlCol="0" anchor="ctr"/>
+          <a:lstStyle/>
+          <a:p>
+            <a:pPr algn="ctr"/>
+            <a:endParaRPr lang="en-US"/>
+          </a:p>
+        </p:txBody>
+      </p:sp>
+      <p:sp>
+        <p:nvSpPr>
           <p:cNvPr id="2" name="Title 1">
             <a:extLst>
               <a:ext uri="{FF2B5EF4-FFF2-40B4-BE49-F238E27FC236}">
@@ -4474,8 +4539,8 @@
         </p:nvSpPr>
         <p:spPr>
           <a:xfrm>
-            <a:off x="450272" y="413616"/>
-            <a:ext cx="10903528" cy="954107"/>
+            <a:off x="2804782" y="369483"/>
+            <a:ext cx="7165553" cy="954107"/>
           </a:xfrm>
           <a:prstGeom prst="rect">
             <a:avLst/>
@@ -4489,21 +4554,13 @@
           <a:lstStyle/>
           <a:p>
             <a:r>
-              <a:rPr lang="en-US" sz="2800" dirty="0">
-                <a:solidFill>
-                  <a:schemeClr val="bg1"/>
-                </a:solidFill>
-              </a:rPr>
+              <a:rPr lang="en-US" sz="2800" i="1" dirty="0"/>
               <a:t>“One mustn’t criticize other people on grounds </a:t>
             </a:r>
           </a:p>
           <a:p>
             <a:r>
-              <a:rPr lang="en-US" sz="2800" dirty="0">
-                <a:solidFill>
-                  <a:schemeClr val="bg1"/>
-                </a:solidFill>
-              </a:rPr>
+              <a:rPr lang="en-US" sz="2800" i="1" dirty="0"/>
               <a:t>where he can’t stand perpendicular himself.”</a:t>
             </a:r>
           </a:p>
@@ -4577,26 +4634,54 @@
           <a:chExt cx="0" cy="0"/>
         </a:xfrm>
       </p:grpSpPr>
-      <p:sp>
-        <p:nvSpPr>
-          <p:cNvPr id="2" name="Title 1">
-            <a:extLst>
-              <a:ext uri="{FF2B5EF4-FFF2-40B4-BE49-F238E27FC236}">
-                <a16:creationId xmlns:a16="http://schemas.microsoft.com/office/drawing/2014/main" id="{4504C84E-ECBA-6A48-94B2-1B70BA898A14}"/>
-              </a:ext>
-            </a:extLst>
-          </p:cNvPr>
-          <p:cNvSpPr>
-            <a:spLocks noGrp="1"/>
-          </p:cNvSpPr>
-          <p:nvPr>
-            <p:ph type="title"/>
-          </p:nvPr>
-        </p:nvSpPr>
+      <p:pic>
+        <p:nvPicPr>
+          <p:cNvPr id="5" name="Content Placeholder 4">
+            <a:extLst>
+              <a:ext uri="{FF2B5EF4-FFF2-40B4-BE49-F238E27FC236}">
+                <a16:creationId xmlns:a16="http://schemas.microsoft.com/office/drawing/2014/main" id="{81F49B96-E748-D74D-B111-DB7FD24AB8BB}"/>
+              </a:ext>
+            </a:extLst>
+          </p:cNvPr>
+          <p:cNvPicPr>
+            <a:picLocks noGrp="1" noChangeAspect="1"/>
+          </p:cNvPicPr>
+          <p:nvPr>
+            <p:ph idx="1"/>
+          </p:nvPr>
+        </p:nvPicPr>
+        <p:blipFill>
+          <a:blip r:embed="rId2"/>
+          <a:srcRect/>
+          <a:stretch/>
+        </p:blipFill>
         <p:spPr>
           <a:xfrm>
-            <a:off x="7970982" y="1362652"/>
-            <a:ext cx="3549073" cy="3652693"/>
+            <a:off x="931177" y="1147195"/>
+            <a:ext cx="9921240" cy="5294780"/>
+          </a:xfrm>
+        </p:spPr>
+      </p:pic>
+      <p:sp>
+        <p:nvSpPr>
+          <p:cNvPr id="2" name="Title 1">
+            <a:extLst>
+              <a:ext uri="{FF2B5EF4-FFF2-40B4-BE49-F238E27FC236}">
+                <a16:creationId xmlns:a16="http://schemas.microsoft.com/office/drawing/2014/main" id="{4504C84E-ECBA-6A48-94B2-1B70BA898A14}"/>
+              </a:ext>
+            </a:extLst>
+          </p:cNvPr>
+          <p:cNvSpPr>
+            <a:spLocks noGrp="1"/>
+          </p:cNvSpPr>
+          <p:nvPr>
+            <p:ph type="title"/>
+          </p:nvPr>
+        </p:nvSpPr>
+        <p:spPr>
+          <a:xfrm>
+            <a:off x="849511" y="67112"/>
+            <a:ext cx="10093927" cy="1290633"/>
           </a:xfrm>
         </p:spPr>
         <p:txBody>
@@ -4606,76 +4691,40 @@
           <a:lstStyle/>
           <a:p>
             <a:r>
-              <a:rPr lang="en-US" dirty="0">
+              <a:rPr lang="en-US" sz="4000" dirty="0">
+                <a:solidFill>
+                  <a:srgbClr val="B24CFF"/>
+                </a:solidFill>
+              </a:rPr>
+              <a:t>Aphorism scores </a:t>
+            </a:r>
+            <a:r>
+              <a:rPr lang="en-US" sz="4000" dirty="0">
                 <a:solidFill>
                   <a:schemeClr val="bg1"/>
                 </a:solidFill>
               </a:rPr>
-              <a:t>Results:</a:t>
-            </a:r>
-            <a:br>
-              <a:rPr lang="en-US" dirty="0">
+              <a:t>for</a:t>
+            </a:r>
+            <a:r>
+              <a:rPr lang="en-US" sz="4000" dirty="0">
+                <a:solidFill>
+                  <a:srgbClr val="B24CFF"/>
+                </a:solidFill>
+              </a:rPr>
+              <a:t> </a:t>
+            </a:r>
+            <a:r>
+              <a:rPr lang="en-US" sz="4000" dirty="0">
                 <a:solidFill>
                   <a:schemeClr val="bg1"/>
                 </a:solidFill>
               </a:rPr>
-            </a:br>
-            <a:r>
-              <a:rPr lang="en-US" sz="4000" dirty="0">
-                <a:solidFill>
-                  <a:srgbClr val="B24CFF"/>
-                </a:solidFill>
-              </a:rPr>
-              <a:t>Autobiography’s sentences </a:t>
-            </a:r>
-            <a:r>
-              <a:rPr lang="en-US" sz="4000" dirty="0">
-                <a:solidFill>
-                  <a:schemeClr val="bg1"/>
-                </a:solidFill>
-              </a:rPr>
-              <a:t>and</a:t>
-            </a:r>
-            <a:r>
-              <a:rPr lang="en-US" sz="4000" dirty="0">
-                <a:solidFill>
-                  <a:srgbClr val="B24CFF"/>
-                </a:solidFill>
-              </a:rPr>
-              <a:t> Twain’s Aphorisms</a:t>
-            </a:r>
-          </a:p>
-        </p:txBody>
-      </p:sp>
-      <p:pic>
-        <p:nvPicPr>
-          <p:cNvPr id="5" name="Content Placeholder 4" descr="Chart, scatter chart&#10;&#10;Description automatically generated">
-            <a:extLst>
-              <a:ext uri="{FF2B5EF4-FFF2-40B4-BE49-F238E27FC236}">
-                <a16:creationId xmlns:a16="http://schemas.microsoft.com/office/drawing/2014/main" id="{81F49B96-E748-D74D-B111-DB7FD24AB8BB}"/>
-              </a:ext>
-            </a:extLst>
-          </p:cNvPr>
-          <p:cNvPicPr>
-            <a:picLocks noGrp="1" noChangeAspect="1"/>
-          </p:cNvPicPr>
-          <p:nvPr>
-            <p:ph idx="1"/>
-          </p:nvPr>
-        </p:nvPicPr>
-        <p:blipFill>
-          <a:blip r:embed="rId2"/>
-          <a:stretch>
-            <a:fillRect/>
-          </a:stretch>
-        </p:blipFill>
-        <p:spPr>
-          <a:xfrm>
-            <a:off x="671945" y="907446"/>
-            <a:ext cx="6883400" cy="5043108"/>
-          </a:xfrm>
-        </p:spPr>
-      </p:pic>
+              <a:t>Autobiography’s sentences</a:t>
+            </a:r>
+          </a:p>
+        </p:txBody>
+      </p:sp>
     </p:spTree>
     <p:extLst>
       <p:ext uri="{BB962C8B-B14F-4D97-AF65-F5344CB8AC3E}">
@@ -4714,71 +4763,12 @@
           <a:chExt cx="0" cy="0"/>
         </a:xfrm>
       </p:grpSpPr>
-      <p:sp>
-        <p:nvSpPr>
-          <p:cNvPr id="2" name="Title 1">
-            <a:extLst>
-              <a:ext uri="{FF2B5EF4-FFF2-40B4-BE49-F238E27FC236}">
-                <a16:creationId xmlns:a16="http://schemas.microsoft.com/office/drawing/2014/main" id="{E38E7717-0C38-8445-993B-CF9657CFEAE2}"/>
-              </a:ext>
-            </a:extLst>
-          </p:cNvPr>
-          <p:cNvSpPr>
-            <a:spLocks noGrp="1"/>
-          </p:cNvSpPr>
-          <p:nvPr>
-            <p:ph type="title"/>
-          </p:nvPr>
-        </p:nvSpPr>
-        <p:spPr>
-          <a:xfrm>
-            <a:off x="357909" y="1390362"/>
-            <a:ext cx="3659909" cy="3375602"/>
-          </a:xfrm>
-        </p:spPr>
-        <p:txBody>
-          <a:bodyPr>
-            <a:normAutofit/>
-          </a:bodyPr>
-          <a:lstStyle/>
-          <a:p>
-            <a:r>
-              <a:rPr lang="en-US" dirty="0">
-                <a:solidFill>
-                  <a:schemeClr val="bg1"/>
-                </a:solidFill>
-              </a:rPr>
-              <a:t>Results:</a:t>
-            </a:r>
-            <a:br>
-              <a:rPr lang="en-US" dirty="0">
-                <a:solidFill>
-                  <a:schemeClr val="bg1"/>
-                </a:solidFill>
-              </a:rPr>
-            </a:br>
-            <a:r>
-              <a:rPr lang="en-US" sz="4000" dirty="0">
-                <a:solidFill>
-                  <a:srgbClr val="00B050"/>
-                </a:solidFill>
-              </a:rPr>
-              <a:t>Using AIC to Select Models</a:t>
-            </a:r>
-            <a:endParaRPr lang="en-US" dirty="0">
-              <a:solidFill>
-                <a:srgbClr val="00B050"/>
-              </a:solidFill>
-            </a:endParaRPr>
-          </a:p>
-        </p:txBody>
-      </p:sp>
       <p:pic>
         <p:nvPicPr>
           <p:cNvPr id="5" name="Content Placeholder 4">
             <a:extLst>
               <a:ext uri="{FF2B5EF4-FFF2-40B4-BE49-F238E27FC236}">
-                <a16:creationId xmlns:a16="http://schemas.microsoft.com/office/drawing/2014/main" id="{25E40B2D-0A31-1B4F-BB76-1EB7C7D2AE11}"/>
+                <a16:creationId xmlns:a16="http://schemas.microsoft.com/office/drawing/2014/main" id="{81F49B96-E748-D74D-B111-DB7FD24AB8BB}"/>
               </a:ext>
             </a:extLst>
           </p:cNvPr>
@@ -4796,15 +4786,83 @@
         </p:blipFill>
         <p:spPr>
           <a:xfrm>
-            <a:off x="3844877" y="1132480"/>
-            <a:ext cx="7641383" cy="4584830"/>
+            <a:off x="864136" y="1115736"/>
+            <a:ext cx="9944434" cy="5298519"/>
           </a:xfrm>
         </p:spPr>
       </p:pic>
+      <p:sp>
+        <p:nvSpPr>
+          <p:cNvPr id="2" name="Title 1">
+            <a:extLst>
+              <a:ext uri="{FF2B5EF4-FFF2-40B4-BE49-F238E27FC236}">
+                <a16:creationId xmlns:a16="http://schemas.microsoft.com/office/drawing/2014/main" id="{4504C84E-ECBA-6A48-94B2-1B70BA898A14}"/>
+              </a:ext>
+            </a:extLst>
+          </p:cNvPr>
+          <p:cNvSpPr>
+            <a:spLocks noGrp="1"/>
+          </p:cNvSpPr>
+          <p:nvPr>
+            <p:ph type="title"/>
+          </p:nvPr>
+        </p:nvSpPr>
+        <p:spPr>
+          <a:xfrm>
+            <a:off x="849511" y="67112"/>
+            <a:ext cx="10093927" cy="1290633"/>
+          </a:xfrm>
+        </p:spPr>
+        <p:txBody>
+          <a:bodyPr>
+            <a:normAutofit/>
+          </a:bodyPr>
+          <a:lstStyle/>
+          <a:p>
+            <a:r>
+              <a:rPr lang="en-US" sz="4000" dirty="0">
+                <a:solidFill>
+                  <a:schemeClr val="bg1"/>
+                </a:solidFill>
+              </a:rPr>
+              <a:t>Using </a:t>
+            </a:r>
+            <a:r>
+              <a:rPr lang="en-US" sz="4000" dirty="0">
+                <a:solidFill>
+                  <a:srgbClr val="00B050"/>
+                </a:solidFill>
+              </a:rPr>
+              <a:t>AIC </a:t>
+            </a:r>
+            <a:r>
+              <a:rPr lang="en-US" sz="4000" dirty="0">
+                <a:solidFill>
+                  <a:schemeClr val="bg1"/>
+                </a:solidFill>
+              </a:rPr>
+              <a:t>to</a:t>
+            </a:r>
+            <a:r>
+              <a:rPr lang="en-US" sz="4000" dirty="0">
+                <a:solidFill>
+                  <a:srgbClr val="00B050"/>
+                </a:solidFill>
+              </a:rPr>
+              <a:t> Select Models</a:t>
+            </a:r>
+            <a:endParaRPr lang="en-US" sz="4000" dirty="0">
+              <a:solidFill>
+                <a:schemeClr val="bg1"/>
+              </a:solidFill>
+            </a:endParaRPr>
+          </a:p>
+        </p:txBody>
+      </p:sp>
     </p:spTree>
     <p:extLst>
       <p:ext uri="{BB962C8B-B14F-4D97-AF65-F5344CB8AC3E}">
-        <p14:creationId xmlns:p14="http://schemas.microsoft.com/office/powerpoint/2010/main" val="3859309111"/>
+        <p14:creationId xmlns:p14="http://schemas.microsoft.com/office/powerpoint/2010/main" val="187354548"/>
       </p:ext>
     </p:extLst>
   </p:cSld>
@@ -4841,6 +4899,140 @@
       </p:grpSpPr>
       <p:pic>
         <p:nvPicPr>
+          <p:cNvPr id="5" name="Content Placeholder 4">
+            <a:extLst>
+              <a:ext uri="{FF2B5EF4-FFF2-40B4-BE49-F238E27FC236}">
+                <a16:creationId xmlns:a16="http://schemas.microsoft.com/office/drawing/2014/main" id="{81F49B96-E748-D74D-B111-DB7FD24AB8BB}"/>
+              </a:ext>
+            </a:extLst>
+          </p:cNvPr>
+          <p:cNvPicPr>
+            <a:picLocks noGrp="1" noChangeAspect="1"/>
+          </p:cNvPicPr>
+          <p:nvPr>
+            <p:ph idx="1"/>
+          </p:nvPr>
+        </p:nvPicPr>
+        <p:blipFill>
+          <a:blip r:embed="rId2"/>
+          <a:srcRect/>
+          <a:stretch/>
+        </p:blipFill>
+        <p:spPr>
+          <a:xfrm>
+            <a:off x="923358" y="1051082"/>
+            <a:ext cx="9773333" cy="5497500"/>
+          </a:xfrm>
+        </p:spPr>
+      </p:pic>
+      <p:sp>
+        <p:nvSpPr>
+          <p:cNvPr id="2" name="Title 1">
+            <a:extLst>
+              <a:ext uri="{FF2B5EF4-FFF2-40B4-BE49-F238E27FC236}">
+                <a16:creationId xmlns:a16="http://schemas.microsoft.com/office/drawing/2014/main" id="{4504C84E-ECBA-6A48-94B2-1B70BA898A14}"/>
+              </a:ext>
+            </a:extLst>
+          </p:cNvPr>
+          <p:cNvSpPr>
+            <a:spLocks noGrp="1"/>
+          </p:cNvSpPr>
+          <p:nvPr>
+            <p:ph type="title"/>
+          </p:nvPr>
+        </p:nvSpPr>
+        <p:spPr>
+          <a:xfrm>
+            <a:off x="849511" y="67112"/>
+            <a:ext cx="10093927" cy="1290633"/>
+          </a:xfrm>
+        </p:spPr>
+        <p:txBody>
+          <a:bodyPr>
+            <a:normAutofit/>
+          </a:bodyPr>
+          <a:lstStyle/>
+          <a:p>
+            <a:r>
+              <a:rPr lang="en-US" sz="4000" dirty="0">
+                <a:solidFill>
+                  <a:srgbClr val="FFFF00"/>
+                </a:solidFill>
+              </a:rPr>
+              <a:t>More Accurate Result</a:t>
+            </a:r>
+            <a:r>
+              <a:rPr lang="en-US" sz="4000" dirty="0">
+                <a:solidFill>
+                  <a:srgbClr val="00B050"/>
+                </a:solidFill>
+              </a:rPr>
+              <a:t> </a:t>
+            </a:r>
+            <a:r>
+              <a:rPr lang="en-US" sz="4000" dirty="0">
+                <a:solidFill>
+                  <a:schemeClr val="bg1"/>
+                </a:solidFill>
+              </a:rPr>
+              <a:t>with </a:t>
+            </a:r>
+            <a:r>
+              <a:rPr lang="en-US" sz="4000" dirty="0">
+                <a:solidFill>
+                  <a:srgbClr val="00B050"/>
+                </a:solidFill>
+              </a:rPr>
+              <a:t>Statistical Basis</a:t>
+            </a:r>
+            <a:endParaRPr lang="en-US" sz="4000" dirty="0">
+              <a:solidFill>
+                <a:schemeClr val="bg1"/>
+              </a:solidFill>
+            </a:endParaRPr>
+          </a:p>
+        </p:txBody>
+      </p:sp>
+    </p:spTree>
+    <p:extLst>
+      <p:ext uri="{BB962C8B-B14F-4D97-AF65-F5344CB8AC3E}">
+        <p14:creationId xmlns:p14="http://schemas.microsoft.com/office/powerpoint/2010/main" val="3691519562"/>
+      </p:ext>
+    </p:extLst>
+  </p:cSld>
+  <p:clrMapOvr>
+    <a:masterClrMapping/>
+  </p:clrMapOvr>
+</p:sld>
+</file>
+
+<file path=ppt/slides/slide9.xml><?xml version="1.0" encoding="utf-8"?>
+<p:sld xmlns:a="http://schemas.openxmlformats.org/drawingml/2006/main" xmlns:r="http://schemas.openxmlformats.org/officeDocument/2006/relationships" xmlns:p="http://schemas.openxmlformats.org/presentationml/2006/main">
+  <p:cSld>
+    <p:bg>
+      <p:bgPr>
+        <a:solidFill>
+          <a:schemeClr val="tx1"/>
+        </a:solidFill>
+        <a:effectLst/>
+      </p:bgPr>
+    </p:bg>
+    <p:spTree>
+      <p:nvGrpSpPr>
+        <p:cNvPr id="1" name=""/>
+        <p:cNvGrpSpPr/>
+        <p:nvPr/>
+      </p:nvGrpSpPr>
+      <p:grpSpPr>
+        <a:xfrm>
+          <a:off x="0" y="0"/>
+          <a:ext cx="0" cy="0"/>
+          <a:chOff x="0" y="0"/>
+          <a:chExt cx="0" cy="0"/>
+        </a:xfrm>
+      </p:grpSpPr>
+      <p:pic>
+        <p:nvPicPr>
           <p:cNvPr id="23" name="Picture 22" descr="Icon&#10;&#10;Description automatically generated">
             <a:extLst>
               <a:ext uri="{FF2B5EF4-FFF2-40B4-BE49-F238E27FC236}">
@@ -4915,42 +5107,47 @@
             <p:ph type="title"/>
           </p:nvPr>
         </p:nvSpPr>
-        <p:spPr/>
-        <p:txBody>
-          <a:bodyPr/>
-          <a:lstStyle/>
-          <a:p>
-            <a:r>
-              <a:rPr lang="en-US" dirty="0">
-                <a:solidFill>
-                  <a:srgbClr val="00B050"/>
-                </a:solidFill>
-              </a:rPr>
-              <a:t>Thanks, and Stay Tuned!</a:t>
-            </a:r>
-          </a:p>
-        </p:txBody>
-      </p:sp>
-      <p:sp>
-        <p:nvSpPr>
-          <p:cNvPr id="3" name="Content Placeholder 2">
-            <a:extLst>
-              <a:ext uri="{FF2B5EF4-FFF2-40B4-BE49-F238E27FC236}">
-                <a16:creationId xmlns:a16="http://schemas.microsoft.com/office/drawing/2014/main" id="{307B859A-D579-C546-BC54-1B4A0E4C18B0}"/>
-              </a:ext>
-            </a:extLst>
-          </p:cNvPr>
-          <p:cNvSpPr>
-            <a:spLocks noGrp="1"/>
-          </p:cNvSpPr>
-          <p:nvPr>
-            <p:ph idx="1"/>
-          </p:nvPr>
-        </p:nvSpPr>
         <p:spPr>
           <a:xfrm>
-            <a:off x="838200" y="1800474"/>
-            <a:ext cx="10102849" cy="1453572"/>
+            <a:off x="838200" y="21176"/>
+            <a:ext cx="10515600" cy="1325563"/>
+          </a:xfrm>
+        </p:spPr>
+        <p:txBody>
+          <a:bodyPr/>
+          <a:lstStyle/>
+          <a:p>
+            <a:r>
+              <a:rPr lang="en-US" dirty="0">
+                <a:solidFill>
+                  <a:srgbClr val="00B050"/>
+                </a:solidFill>
+              </a:rPr>
+              <a:t>Thanks, and Stay Tuned!</a:t>
+            </a:r>
+          </a:p>
+        </p:txBody>
+      </p:sp>
+      <p:sp>
+        <p:nvSpPr>
+          <p:cNvPr id="3" name="Content Placeholder 2">
+            <a:extLst>
+              <a:ext uri="{FF2B5EF4-FFF2-40B4-BE49-F238E27FC236}">
+                <a16:creationId xmlns:a16="http://schemas.microsoft.com/office/drawing/2014/main" id="{307B859A-D579-C546-BC54-1B4A0E4C18B0}"/>
+              </a:ext>
+            </a:extLst>
+          </p:cNvPr>
+          <p:cNvSpPr>
+            <a:spLocks noGrp="1"/>
+          </p:cNvSpPr>
+          <p:nvPr>
+            <p:ph idx="1"/>
+          </p:nvPr>
+        </p:nvSpPr>
+        <p:spPr>
+          <a:xfrm>
+            <a:off x="838199" y="1061868"/>
+            <a:ext cx="10102849" cy="1231589"/>
           </a:xfrm>
         </p:spPr>
         <p:txBody>
@@ -5061,6 +5258,262 @@
           </a:prstGeom>
         </p:spPr>
       </p:pic>
+      <p:sp>
+        <p:nvSpPr>
+          <p:cNvPr id="27" name="TextBox 26">
+            <a:extLst>
+              <a:ext uri="{FF2B5EF4-FFF2-40B4-BE49-F238E27FC236}">
+                <a16:creationId xmlns:a16="http://schemas.microsoft.com/office/drawing/2014/main" id="{17F3EF78-2713-E746-B364-559E88233806}"/>
+              </a:ext>
+            </a:extLst>
+          </p:cNvPr>
+          <p:cNvSpPr txBox="1"/>
+          <p:nvPr/>
+        </p:nvSpPr>
+        <p:spPr>
+          <a:xfrm>
+            <a:off x="2234561" y="2467437"/>
+            <a:ext cx="7165553" cy="523220"/>
+          </a:xfrm>
+          <a:prstGeom prst="rect">
+            <a:avLst/>
+          </a:prstGeom>
+          <a:noFill/>
+        </p:spPr>
+        <p:txBody>
+          <a:bodyPr wrap="square" rtlCol="0">
+            <a:spAutoFit/>
+          </a:bodyPr>
+          <a:lstStyle/>
+          <a:p>
+            <a:r>
+              <a:rPr lang="en-US" sz="2800" i="1" dirty="0">
+                <a:solidFill>
+                  <a:schemeClr val="bg1"/>
+                </a:solidFill>
+              </a:rPr>
+              <a:t>“Present conditions exhibit curious anomalies.”</a:t>
+            </a:r>
+          </a:p>
+        </p:txBody>
+      </p:sp>
+      <p:sp>
+        <p:nvSpPr>
+          <p:cNvPr id="29" name="TextBox 28">
+            <a:extLst>
+              <a:ext uri="{FF2B5EF4-FFF2-40B4-BE49-F238E27FC236}">
+                <a16:creationId xmlns:a16="http://schemas.microsoft.com/office/drawing/2014/main" id="{90E4BED4-F31A-984D-9DC7-C3080D035C2C}"/>
+              </a:ext>
+            </a:extLst>
+          </p:cNvPr>
+          <p:cNvSpPr txBox="1"/>
+          <p:nvPr/>
+        </p:nvSpPr>
+        <p:spPr>
+          <a:xfrm>
+            <a:off x="3549945" y="3369968"/>
+            <a:ext cx="6035030" cy="954107"/>
+          </a:xfrm>
+          <a:prstGeom prst="rect">
+            <a:avLst/>
+          </a:prstGeom>
+          <a:noFill/>
+        </p:spPr>
+        <p:txBody>
+          <a:bodyPr wrap="square" rtlCol="0">
+            <a:spAutoFit/>
+          </a:bodyPr>
+          <a:lstStyle/>
+          <a:p>
+            <a:r>
+              <a:rPr lang="en-US" sz="2800" i="1" dirty="0">
+                <a:solidFill>
+                  <a:schemeClr val="bg1"/>
+                </a:solidFill>
+              </a:rPr>
+              <a:t>AIC suggests Generalized Least Squares </a:t>
+            </a:r>
+          </a:p>
+          <a:p>
+            <a:r>
+              <a:rPr lang="en-US" sz="2800" i="1" dirty="0">
+                <a:solidFill>
+                  <a:schemeClr val="bg1"/>
+                </a:solidFill>
+              </a:rPr>
+              <a:t>with autoregressive covariance.</a:t>
+            </a:r>
+          </a:p>
+        </p:txBody>
+      </p:sp>
+      <p:sp>
+        <p:nvSpPr>
+          <p:cNvPr id="31" name="TextBox 30">
+            <a:extLst>
+              <a:ext uri="{FF2B5EF4-FFF2-40B4-BE49-F238E27FC236}">
+                <a16:creationId xmlns:a16="http://schemas.microsoft.com/office/drawing/2014/main" id="{A9A4FDC7-2659-814E-AC89-055384B126D9}"/>
+              </a:ext>
+            </a:extLst>
+          </p:cNvPr>
+          <p:cNvSpPr txBox="1"/>
+          <p:nvPr/>
+        </p:nvSpPr>
+        <p:spPr>
+          <a:xfrm>
+            <a:off x="3710934" y="4806207"/>
+            <a:ext cx="3056659" cy="523220"/>
+          </a:xfrm>
+          <a:prstGeom prst="rect">
+            <a:avLst/>
+          </a:prstGeom>
+          <a:noFill/>
+        </p:spPr>
+        <p:txBody>
+          <a:bodyPr wrap="square" rtlCol="0">
+            <a:spAutoFit/>
+          </a:bodyPr>
+          <a:lstStyle/>
+          <a:p>
+            <a:r>
+              <a:rPr lang="en-US" sz="2800" i="1" dirty="0">
+                <a:solidFill>
+                  <a:schemeClr val="bg1"/>
+                </a:solidFill>
+              </a:rPr>
+              <a:t>That’s what I said!</a:t>
+            </a:r>
+          </a:p>
+        </p:txBody>
+      </p:sp>
+      <p:cxnSp>
+        <p:nvCxnSpPr>
+          <p:cNvPr id="35" name="Straight Connector 34">
+            <a:extLst>
+              <a:ext uri="{FF2B5EF4-FFF2-40B4-BE49-F238E27FC236}">
+                <a16:creationId xmlns:a16="http://schemas.microsoft.com/office/drawing/2014/main" id="{1D5A4450-2010-8743-BEA9-C94DD7B352A7}"/>
+              </a:ext>
+            </a:extLst>
+          </p:cNvPr>
+          <p:cNvCxnSpPr>
+            <a:cxnSpLocks/>
+          </p:cNvCxnSpPr>
+          <p:nvPr/>
+        </p:nvCxnSpPr>
+        <p:spPr>
+          <a:xfrm flipV="1">
+            <a:off x="1935359" y="3007082"/>
+            <a:ext cx="429150" cy="563255"/>
+          </a:xfrm>
+          <a:prstGeom prst="line">
+            <a:avLst/>
+          </a:prstGeom>
+          <a:ln w="25400">
+            <a:solidFill>
+              <a:schemeClr val="bg1"/>
+            </a:solidFill>
+          </a:ln>
+        </p:spPr>
+        <p:style>
+          <a:lnRef idx="1">
+            <a:schemeClr val="accent1"/>
+          </a:lnRef>
+          <a:fillRef idx="0">
+            <a:schemeClr val="accent1"/>
+          </a:fillRef>
+          <a:effectRef idx="0">
+            <a:schemeClr val="accent1"/>
+          </a:effectRef>
+          <a:fontRef idx="minor">
+            <a:schemeClr val="tx1"/>
+          </a:fontRef>
+        </p:style>
+      </p:cxnSp>
+      <p:cxnSp>
+        <p:nvCxnSpPr>
+          <p:cNvPr id="39" name="Straight Connector 38">
+            <a:extLst>
+              <a:ext uri="{FF2B5EF4-FFF2-40B4-BE49-F238E27FC236}">
+                <a16:creationId xmlns:a16="http://schemas.microsoft.com/office/drawing/2014/main" id="{61644B37-B2EA-C941-820A-D465E75F8A13}"/>
+              </a:ext>
+            </a:extLst>
+          </p:cNvPr>
+          <p:cNvCxnSpPr>
+            <a:cxnSpLocks/>
+          </p:cNvCxnSpPr>
+          <p:nvPr/>
+        </p:nvCxnSpPr>
+        <p:spPr>
+          <a:xfrm flipH="1" flipV="1">
+            <a:off x="8440384" y="4230255"/>
+            <a:ext cx="536924" cy="473132"/>
+          </a:xfrm>
+          <a:prstGeom prst="line">
+            <a:avLst/>
+          </a:prstGeom>
+          <a:ln w="25400">
+            <a:solidFill>
+              <a:schemeClr val="bg1"/>
+            </a:solidFill>
+          </a:ln>
+        </p:spPr>
+        <p:style>
+          <a:lnRef idx="1">
+            <a:schemeClr val="accent1"/>
+          </a:lnRef>
+          <a:fillRef idx="0">
+            <a:schemeClr val="accent1"/>
+          </a:fillRef>
+          <a:effectRef idx="0">
+            <a:schemeClr val="accent1"/>
+          </a:effectRef>
+          <a:fontRef idx="minor">
+            <a:schemeClr val="tx1"/>
+          </a:fontRef>
+        </p:style>
+      </p:cxnSp>
+      <p:cxnSp>
+        <p:nvCxnSpPr>
+          <p:cNvPr id="42" name="Straight Connector 41">
+            <a:extLst>
+              <a:ext uri="{FF2B5EF4-FFF2-40B4-BE49-F238E27FC236}">
+                <a16:creationId xmlns:a16="http://schemas.microsoft.com/office/drawing/2014/main" id="{26E54335-7531-F344-8FB3-52397F1245D6}"/>
+              </a:ext>
+            </a:extLst>
+          </p:cNvPr>
+          <p:cNvCxnSpPr>
+            <a:cxnSpLocks/>
+          </p:cNvCxnSpPr>
+          <p:nvPr/>
+        </p:nvCxnSpPr>
+        <p:spPr>
+          <a:xfrm flipV="1">
+            <a:off x="2883847" y="5067817"/>
+            <a:ext cx="666098" cy="141492"/>
+          </a:xfrm>
+          <a:prstGeom prst="line">
+            <a:avLst/>
+          </a:prstGeom>
+          <a:ln w="25400">
+            <a:solidFill>
+              <a:schemeClr val="bg1"/>
+            </a:solidFill>
+          </a:ln>
+        </p:spPr>
+        <p:style>
+          <a:lnRef idx="1">
+            <a:schemeClr val="accent1"/>
+          </a:lnRef>
+          <a:fillRef idx="0">
+            <a:schemeClr val="accent1"/>
+          </a:fillRef>
+          <a:effectRef idx="0">
+            <a:schemeClr val="accent1"/>
+          </a:effectRef>
+          <a:fontRef idx="minor">
+            <a:schemeClr val="tx1"/>
+          </a:fontRef>
+        </p:style>
+      </p:cxnSp>
     </p:spTree>
     <p:extLst>
       <p:ext uri="{BB962C8B-B14F-4D97-AF65-F5344CB8AC3E}">

</xml_diff>

<commit_message>
NYU DH Showcase presentation - final commit
</commit_message>
<xml_diff>
--- a/nyudh_summerfellowship_jonathan_armoza.pptx
+++ b/nyudh_summerfellowship_jonathan_armoza.pptx
@@ -3919,12 +3919,12 @@
         <p:spPr>
           <a:xfrm>
             <a:off x="838200" y="1825625"/>
-            <a:ext cx="5858164" cy="4449340"/>
+            <a:ext cx="5858164" cy="4566122"/>
           </a:xfrm>
         </p:spPr>
         <p:txBody>
           <a:bodyPr>
-            <a:normAutofit fontScale="92500" lnSpcReduction="20000"/>
+            <a:normAutofit fontScale="92500" lnSpcReduction="10000"/>
           </a:bodyPr>
           <a:lstStyle/>
           <a:p>
@@ -3991,7 +3991,7 @@
                   <a:schemeClr val="bg1"/>
                 </a:solidFill>
               </a:rPr>
-              <a:t>Used when no out of sample data is available or small data size</a:t>
+              <a:t>Used when no out-of-sample data is available or small data size</a:t>
             </a:r>
           </a:p>
           <a:p>
@@ -4001,7 +4001,7 @@
                   <a:schemeClr val="bg1"/>
                 </a:solidFill>
               </a:rPr>
-              <a:t>An alternative to traditional hypothesis testing</a:t>
+              <a:t>An alternative/complement to traditional hypothesis testing</a:t>
             </a:r>
           </a:p>
           <a:p>

</xml_diff>